<commit_message>
contact form now send sends emails
</commit_message>
<xml_diff>
--- a/client/public/Media/Beer Me.pptx
+++ b/client/public/Media/Beer Me.pptx
@@ -124,8 +124,8 @@
 <pc:chgInfo xmlns:a="http://schemas.openxmlformats.org/drawingml/2006/main" xmlns:r="http://schemas.openxmlformats.org/officeDocument/2006/relationships" xmlns:ac="http://schemas.microsoft.com/office/drawing/2013/main/command" xmlns:pc="http://schemas.microsoft.com/office/powerpoint/2013/main/command">
   <pc:docChgLst>
     <pc:chgData name="Jason Fletcher" userId="27a621f4a2aec701" providerId="LiveId" clId="{CD648101-D3C6-484E-98FC-4A9D2B46C323}"/>
-    <pc:docChg chg="modSld">
-      <pc:chgData name="Jason Fletcher" userId="27a621f4a2aec701" providerId="LiveId" clId="{CD648101-D3C6-484E-98FC-4A9D2B46C323}" dt="2021-06-03T19:03:41.155" v="4" actId="20577"/>
+    <pc:docChg chg="undo custSel modSld">
+      <pc:chgData name="Jason Fletcher" userId="27a621f4a2aec701" providerId="LiveId" clId="{CD648101-D3C6-484E-98FC-4A9D2B46C323}" dt="2021-06-05T01:11:11.080" v="7" actId="1076"/>
       <pc:docMkLst>
         <pc:docMk/>
       </pc:docMkLst>
@@ -145,6 +145,21 @@
         </pc:spChg>
       </pc:sldChg>
       <pc:sldChg chg="modSp mod">
+        <pc:chgData name="Jason Fletcher" userId="27a621f4a2aec701" providerId="LiveId" clId="{CD648101-D3C6-484E-98FC-4A9D2B46C323}" dt="2021-06-05T01:11:11.080" v="7" actId="1076"/>
+        <pc:sldMkLst>
+          <pc:docMk/>
+          <pc:sldMk cId="633738316" sldId="259"/>
+        </pc:sldMkLst>
+        <pc:picChg chg="mod">
+          <ac:chgData name="Jason Fletcher" userId="27a621f4a2aec701" providerId="LiveId" clId="{CD648101-D3C6-484E-98FC-4A9D2B46C323}" dt="2021-06-05T01:11:11.080" v="7" actId="1076"/>
+          <ac:picMkLst>
+            <pc:docMk/>
+            <pc:sldMk cId="633738316" sldId="259"/>
+            <ac:picMk id="5" creationId="{91BC5572-FC33-4C1C-8DEE-C2CF75A75641}"/>
+          </ac:picMkLst>
+        </pc:picChg>
+      </pc:sldChg>
+      <pc:sldChg chg="modSp mod">
         <pc:chgData name="Jason Fletcher" userId="27a621f4a2aec701" providerId="LiveId" clId="{CD648101-D3C6-484E-98FC-4A9D2B46C323}" dt="2021-06-03T19:03:41.155" v="4" actId="20577"/>
         <pc:sldMkLst>
           <pc:docMk/>
@@ -158,6 +173,21 @@
             <ac:spMk id="5" creationId="{9726328E-CDC6-4D0A-AAD3-D7414073E4CC}"/>
           </ac:spMkLst>
         </pc:spChg>
+      </pc:sldChg>
+      <pc:sldChg chg="modSp mod">
+        <pc:chgData name="Jason Fletcher" userId="27a621f4a2aec701" providerId="LiveId" clId="{CD648101-D3C6-484E-98FC-4A9D2B46C323}" dt="2021-06-04T22:07:45.377" v="6" actId="1076"/>
+        <pc:sldMkLst>
+          <pc:docMk/>
+          <pc:sldMk cId="1932928923" sldId="264"/>
+        </pc:sldMkLst>
+        <pc:picChg chg="mod">
+          <ac:chgData name="Jason Fletcher" userId="27a621f4a2aec701" providerId="LiveId" clId="{CD648101-D3C6-484E-98FC-4A9D2B46C323}" dt="2021-06-04T22:07:45.377" v="6" actId="1076"/>
+          <ac:picMkLst>
+            <pc:docMk/>
+            <pc:sldMk cId="1932928923" sldId="264"/>
+            <ac:picMk id="5" creationId="{91BC5572-FC33-4C1C-8DEE-C2CF75A75641}"/>
+          </ac:picMkLst>
+        </pc:picChg>
       </pc:sldChg>
     </pc:docChg>
   </pc:docChgLst>
@@ -16239,7 +16269,7 @@
           <a:p>
             <a:fld id="{88D38747-4367-4BD2-8D51-C97E202738E2}" type="datetime1">
               <a:rPr lang="en-US" smtClean="0"/>
-              <a:t>6/3/2021</a:t>
+              <a:t>6/4/2021</a:t>
             </a:fld>
             <a:endParaRPr lang="en-US" dirty="0"/>
           </a:p>
@@ -16544,7 +16574,7 @@
           <a:p>
             <a:fld id="{11F1B079-7EF0-44EE-B798-BCC497C9F3B2}" type="datetime1">
               <a:rPr lang="en-US" smtClean="0"/>
-              <a:t>6/3/2021</a:t>
+              <a:t>6/4/2021</a:t>
             </a:fld>
             <a:endParaRPr lang="en-US" dirty="0"/>
           </a:p>
@@ -16738,7 +16768,7 @@
           <a:p>
             <a:fld id="{28FF70A8-1D13-4657-95F0-A9EA54967B8D}" type="datetime1">
               <a:rPr lang="en-US" smtClean="0"/>
-              <a:t>6/3/2021</a:t>
+              <a:t>6/4/2021</a:t>
             </a:fld>
             <a:endParaRPr lang="en-US" dirty="0"/>
           </a:p>
@@ -17001,7 +17031,7 @@
           <a:p>
             <a:fld id="{21EB90AC-71BD-4C7F-8ACA-7B3F18292E63}" type="datetime1">
               <a:rPr lang="en-US" smtClean="0"/>
-              <a:t>6/3/2021</a:t>
+              <a:t>6/4/2021</a:t>
             </a:fld>
             <a:endParaRPr lang="en-US" dirty="0"/>
           </a:p>
@@ -17437,7 +17467,7 @@
           <a:p>
             <a:fld id="{4E6EFC2C-8905-46F0-B443-CE905B76BA01}" type="datetime1">
               <a:rPr lang="en-US" smtClean="0"/>
-              <a:t>6/3/2021</a:t>
+              <a:t>6/4/2021</a:t>
             </a:fld>
             <a:endParaRPr lang="en-US" dirty="0"/>
           </a:p>
@@ -17974,7 +18004,7 @@
           <a:p>
             <a:fld id="{D9079DC3-C9B5-499E-9140-0DC28B7074E2}" type="datetime1">
               <a:rPr lang="en-US" smtClean="0"/>
-              <a:t>6/3/2021</a:t>
+              <a:t>6/4/2021</a:t>
             </a:fld>
             <a:endParaRPr lang="en-US" dirty="0"/>
           </a:p>
@@ -18856,7 +18886,7 @@
           <a:p>
             <a:fld id="{30BB33EA-E472-4D22-9C03-A9C14AA21CED}" type="datetime1">
               <a:rPr lang="en-US" smtClean="0"/>
-              <a:t>6/3/2021</a:t>
+              <a:t>6/4/2021</a:t>
             </a:fld>
             <a:endParaRPr lang="en-US" dirty="0"/>
           </a:p>
@@ -19026,7 +19056,7 @@
           <a:p>
             <a:fld id="{217E833E-1B6D-415F-AD29-75AE8C43BD0D}" type="datetime1">
               <a:rPr lang="en-US" smtClean="0"/>
-              <a:t>6/3/2021</a:t>
+              <a:t>6/4/2021</a:t>
             </a:fld>
             <a:endParaRPr lang="en-US" dirty="0"/>
           </a:p>
@@ -19210,7 +19240,7 @@
           <a:p>
             <a:fld id="{8452596F-08A7-4B70-989A-F2B1CF31E66B}" type="datetime1">
               <a:rPr lang="en-US" smtClean="0"/>
-              <a:t>6/3/2021</a:t>
+              <a:t>6/4/2021</a:t>
             </a:fld>
             <a:endParaRPr lang="en-US" dirty="0"/>
           </a:p>
@@ -19380,7 +19410,7 @@
           <a:p>
             <a:fld id="{73C55A3C-5767-4844-A0A3-83778C2E5409}" type="datetime1">
               <a:rPr lang="en-US" smtClean="0"/>
-              <a:t>6/3/2021</a:t>
+              <a:t>6/4/2021</a:t>
             </a:fld>
             <a:endParaRPr lang="en-US" dirty="0"/>
           </a:p>
@@ -19624,7 +19654,7 @@
           <a:p>
             <a:fld id="{CAE507A8-A5CF-4D38-AB86-7EDDA87A85D4}" type="datetime1">
               <a:rPr lang="en-US" smtClean="0"/>
-              <a:t>6/3/2021</a:t>
+              <a:t>6/4/2021</a:t>
             </a:fld>
             <a:endParaRPr lang="en-US" dirty="0"/>
           </a:p>
@@ -19866,7 +19896,7 @@
           <a:p>
             <a:fld id="{BDFCD27C-8599-43EF-BA1D-14DDC1946E06}" type="datetime1">
               <a:rPr lang="en-US" smtClean="0"/>
-              <a:t>6/3/2021</a:t>
+              <a:t>6/4/2021</a:t>
             </a:fld>
             <a:endParaRPr lang="en-US" dirty="0"/>
           </a:p>
@@ -20349,7 +20379,7 @@
           <a:p>
             <a:fld id="{49343D99-809A-49C0-96E5-4250D0B498EE}" type="datetime1">
               <a:rPr lang="en-US" smtClean="0"/>
-              <a:t>6/3/2021</a:t>
+              <a:t>6/4/2021</a:t>
             </a:fld>
             <a:endParaRPr lang="en-US" dirty="0"/>
           </a:p>
@@ -20467,7 +20497,7 @@
           <a:p>
             <a:fld id="{A143DE9B-B678-4EFB-BB7D-A4370204A0B0}" type="datetime1">
               <a:rPr lang="en-US" smtClean="0"/>
-              <a:t>6/3/2021</a:t>
+              <a:t>6/4/2021</a:t>
             </a:fld>
             <a:endParaRPr lang="en-US" dirty="0"/>
           </a:p>
@@ -20562,7 +20592,7 @@
           <a:p>
             <a:fld id="{E68812DA-F765-4142-A6A3-A8ED7235E082}" type="datetime1">
               <a:rPr lang="en-US" smtClean="0"/>
-              <a:t>6/3/2021</a:t>
+              <a:t>6/4/2021</a:t>
             </a:fld>
             <a:endParaRPr lang="en-US" dirty="0"/>
           </a:p>
@@ -20817,7 +20847,7 @@
           <a:p>
             <a:fld id="{3E0277FD-7DE6-41D4-930D-AC99F5AFE54E}" type="datetime1">
               <a:rPr lang="en-US" smtClean="0"/>
-              <a:t>6/3/2021</a:t>
+              <a:t>6/4/2021</a:t>
             </a:fld>
             <a:endParaRPr lang="en-US" dirty="0"/>
           </a:p>
@@ -21124,7 +21154,7 @@
           <a:p>
             <a:fld id="{9EA15526-7079-4B7B-987C-1B5FAE11A0FF}" type="datetime1">
               <a:rPr lang="en-US" smtClean="0"/>
-              <a:t>6/3/2021</a:t>
+              <a:t>6/4/2021</a:t>
             </a:fld>
             <a:endParaRPr lang="en-US" dirty="0"/>
           </a:p>
@@ -21359,7 +21389,7 @@
           <a:p>
             <a:fld id="{073ED0CC-082F-4160-86E5-0D6041F12778}" type="datetime1">
               <a:rPr lang="en-US" smtClean="0"/>
-              <a:t>6/3/2021</a:t>
+              <a:t>6/4/2021</a:t>
             </a:fld>
             <a:endParaRPr lang="en-US" dirty="0"/>
           </a:p>
@@ -22086,7 +22116,7 @@
         </p:blipFill>
         <p:spPr>
           <a:xfrm>
-            <a:off x="1" y="10"/>
+            <a:off x="1" y="-13740"/>
             <a:ext cx="12192000" cy="6857990"/>
           </a:xfrm>
           <a:prstGeom prst="rect">

</xml_diff>